<commit_message>
more work on phd event
</commit_message>
<xml_diff>
--- a/poster/poster_small.pptx
+++ b/poster/poster_small.pptx
@@ -700,7 +700,7 @@
           </a:ln>
           <a:extLst>
             <a:ext uri="{C572A759-6A51-4108-AA02-DFA0A04FC94B}">
-              <ma14:wrappingTextBoxFlag xmlns:ma14="http://schemas.microsoft.com/office/mac/drawingml/2011/main" xmlns:a14="http://schemas.microsoft.com/office/drawing/2010/main" xmlns:m="http://schemas.openxmlformats.org/officeDocument/2006/math" xmlns="" val="1"/>
+              <ma14:wrappingTextBoxFlag xmlns="" xmlns:m="http://schemas.openxmlformats.org/officeDocument/2006/math" xmlns:a14="http://schemas.microsoft.com/office/drawing/2010/main" xmlns:ma14="http://schemas.microsoft.com/office/mac/drawingml/2011/main" val="1"/>
             </a:ext>
           </a:extLst>
         </p:spPr>
@@ -737,7 +737,7 @@
           </a:ln>
           <a:extLst>
             <a:ext uri="{C572A759-6A51-4108-AA02-DFA0A04FC94B}">
-              <ma14:wrappingTextBoxFlag xmlns:ma14="http://schemas.microsoft.com/office/mac/drawingml/2011/main" xmlns:a14="http://schemas.microsoft.com/office/drawing/2010/main" xmlns:m="http://schemas.openxmlformats.org/officeDocument/2006/math" xmlns="" val="1"/>
+              <ma14:wrappingTextBoxFlag xmlns="" xmlns:m="http://schemas.openxmlformats.org/officeDocument/2006/math" xmlns:a14="http://schemas.microsoft.com/office/drawing/2010/main" xmlns:ma14="http://schemas.microsoft.com/office/mac/drawingml/2011/main" val="1"/>
             </a:ext>
           </a:extLst>
         </p:spPr>
@@ -1581,7 +1581,7 @@
           </a:ln>
           <a:extLst>
             <a:ext uri="{C572A759-6A51-4108-AA02-DFA0A04FC94B}">
-              <ma14:wrappingTextBoxFlag xmlns:ma14="http://schemas.microsoft.com/office/mac/drawingml/2011/main" xmlns:a14="http://schemas.microsoft.com/office/drawing/2010/main" xmlns:m="http://schemas.openxmlformats.org/officeDocument/2006/math" xmlns="" val="1"/>
+              <ma14:wrappingTextBoxFlag xmlns="" xmlns:m="http://schemas.openxmlformats.org/officeDocument/2006/math" xmlns:a14="http://schemas.microsoft.com/office/drawing/2010/main" xmlns:ma14="http://schemas.microsoft.com/office/mac/drawingml/2011/main" val="1"/>
             </a:ext>
           </a:extLst>
         </p:spPr>
@@ -1632,7 +1632,7 @@
           </a:ln>
           <a:extLst>
             <a:ext uri="{C572A759-6A51-4108-AA02-DFA0A04FC94B}">
-              <ma14:wrappingTextBoxFlag xmlns:ma14="http://schemas.microsoft.com/office/mac/drawingml/2011/main" xmlns:a14="http://schemas.microsoft.com/office/drawing/2010/main" xmlns:m="http://schemas.openxmlformats.org/officeDocument/2006/math" xmlns="" val="1"/>
+              <ma14:wrappingTextBoxFlag xmlns="" xmlns:m="http://schemas.openxmlformats.org/officeDocument/2006/math" xmlns:a14="http://schemas.microsoft.com/office/drawing/2010/main" xmlns:ma14="http://schemas.microsoft.com/office/mac/drawingml/2011/main" val="1"/>
             </a:ext>
           </a:extLst>
         </p:spPr>
@@ -1667,7 +1667,7 @@
         </p:nvSpPr>
         <p:spPr>
           <a:xfrm>
-            <a:off x="986246" y="5018530"/>
+            <a:off x="1034777" y="4751249"/>
             <a:ext cx="9064534" cy="3934667"/>
           </a:xfrm>
           <a:prstGeom prst="rect">
@@ -1678,7 +1678,7 @@
           </a:ln>
           <a:extLst>
             <a:ext uri="{C572A759-6A51-4108-AA02-DFA0A04FC94B}">
-              <ma14:wrappingTextBoxFlag xmlns:ma14="http://schemas.microsoft.com/office/mac/drawingml/2011/main" xmlns:a14="http://schemas.microsoft.com/office/drawing/2010/main" xmlns:m="http://schemas.openxmlformats.org/officeDocument/2006/math" xmlns="" val="1"/>
+              <ma14:wrappingTextBoxFlag xmlns="" xmlns:m="http://schemas.openxmlformats.org/officeDocument/2006/math" xmlns:a14="http://schemas.microsoft.com/office/drawing/2010/main" xmlns:ma14="http://schemas.microsoft.com/office/mac/drawingml/2011/main" val="1"/>
             </a:ext>
           </a:extLst>
         </p:spPr>
@@ -1705,9 +1705,21 @@
           <a:p>
             <a:r>
               <a:rPr lang="en-US" dirty="0"/>
-              <a:t>Human operators in charge of the black-box decision-making systems do not understand how they works and essentially often they still choose to rely on it blindly. Unfortunately, those individuals who are subject to the decisions produced by such systems typically have no way of challenging them. Counterfactual Explanations (CE) can help the former group to make sense of their system: they explain how inputs into the system would have to change for it to yield a different decision. CEs that involve realistic and actionable changes can be used for the purpose of Algorithmic Recourse (AR): recourse offers individuals in the latter group a way to turn a negative decision into positive one. </a:t>
-            </a:r>
-            <a:endParaRPr lang="en-NL" dirty="0"/>
+              <a:t>Human operators in charge of the black-box decision-making systems do not understand how they works and essentially often they still choose to rely on it blindly. Unfortunately, those individuals who are subject to the decisions produced by such systems typically have no way of challenging them. </a:t>
+            </a:r>
+            <a:r>
+              <a:rPr lang="en-US" b="1" dirty="0"/>
+              <a:t>Counterfactual Explanations (CE) can help programmers make sense of the systems they build</a:t>
+            </a:r>
+            <a:r>
+              <a:rPr lang="en-US" dirty="0"/>
+              <a:t>: they explain how inputs into a system would have to change for it to produce a different output. CEs that involve realistic and actionable changes can be used for the purpose individual recourse: </a:t>
+            </a:r>
+            <a:r>
+              <a:rPr lang="en-US" b="1" dirty="0"/>
+              <a:t>Algorithmic Recourse (AR) offers individuals subject to algorithms a way to turn a negative decision into positive one. </a:t>
+            </a:r>
+            <a:endParaRPr lang="en-NL" b="1" dirty="0"/>
           </a:p>
         </p:txBody>
       </p:sp>
@@ -1719,8 +1731,8 @@
         </p:nvSpPr>
         <p:spPr>
           <a:xfrm>
-            <a:off x="22758763" y="5016731"/>
-            <a:ext cx="9130938" cy="1607876"/>
+            <a:off x="22752685" y="4719333"/>
+            <a:ext cx="9130938" cy="1995675"/>
           </a:xfrm>
           <a:prstGeom prst="rect">
             <a:avLst/>
@@ -1730,7 +1742,7 @@
           </a:ln>
           <a:extLst>
             <a:ext uri="{C572A759-6A51-4108-AA02-DFA0A04FC94B}">
-              <ma14:wrappingTextBoxFlag xmlns:ma14="http://schemas.microsoft.com/office/mac/drawingml/2011/main" xmlns:a14="http://schemas.microsoft.com/office/drawing/2010/main" xmlns:m="http://schemas.openxmlformats.org/officeDocument/2006/math" xmlns="" val="1"/>
+              <ma14:wrappingTextBoxFlag xmlns="" xmlns:m="http://schemas.openxmlformats.org/officeDocument/2006/math" xmlns:a14="http://schemas.microsoft.com/office/drawing/2010/main" xmlns:ma14="http://schemas.microsoft.com/office/mac/drawingml/2011/main" val="1"/>
             </a:ext>
           </a:extLst>
         </p:spPr>
@@ -1757,7 +1769,7 @@
           <a:p>
             <a:r>
               <a:rPr lang="en-GB" dirty="0"/>
-              <a:t>For a our baseline comparison we keep things simple: for example, we let the conventional VAR guide our search for optimal lag length. A short exercise in hyperparameter tuning demonstrates that the Deep VAR is less prone to overfitting with respect to the number of lags among other things. </a:t>
+              <a:t>Our preliminary experiments show that even for Bayesian models AR essentially generates new clusters of individuals. While these clusters remain on the target side of the decision boundary, they could still be distinguished from individuals that were always in the target class. This may leave them vulnerable to discrimination through the system.</a:t>
             </a:r>
           </a:p>
         </p:txBody>
@@ -1770,8 +1782,8 @@
         </p:nvSpPr>
         <p:spPr>
           <a:xfrm>
-            <a:off x="986246" y="9680953"/>
-            <a:ext cx="9064534" cy="1220078"/>
+            <a:off x="1003662" y="9493478"/>
+            <a:ext cx="9064534" cy="1607876"/>
           </a:xfrm>
           <a:prstGeom prst="rect">
             <a:avLst/>
@@ -1781,7 +1793,7 @@
           </a:ln>
           <a:extLst>
             <a:ext uri="{C572A759-6A51-4108-AA02-DFA0A04FC94B}">
-              <ma14:wrappingTextBoxFlag xmlns:ma14="http://schemas.microsoft.com/office/mac/drawingml/2011/main" xmlns:a14="http://schemas.microsoft.com/office/drawing/2010/main" xmlns:m="http://schemas.openxmlformats.org/officeDocument/2006/math" xmlns="" val="1"/>
+              <ma14:wrappingTextBoxFlag xmlns="" xmlns:m="http://schemas.openxmlformats.org/officeDocument/2006/math" xmlns:a14="http://schemas.microsoft.com/office/drawing/2010/main" xmlns:ma14="http://schemas.microsoft.com/office/mac/drawingml/2011/main" val="1"/>
             </a:ext>
           </a:extLst>
         </p:spPr>
@@ -1810,11 +1822,51 @@
             </a:pPr>
             <a:r>
               <a:rPr lang="en-US" dirty="0"/>
-              <a:t>Built a scalable library for CE and AR in Julia: </a:t>
+              <a:t>Built a scalable library for </a:t>
+            </a:r>
+            <a:r>
+              <a:rPr lang="en-US" b="1" dirty="0" err="1"/>
+              <a:t>C</a:t>
             </a:r>
             <a:r>
               <a:rPr lang="en-US" dirty="0" err="1"/>
-              <a:t>CEAR.jl</a:t>
+              <a:t>ounterfactua</a:t>
+            </a:r>
+            <a:r>
+              <a:rPr lang="en-US" b="1" dirty="0" err="1"/>
+              <a:t>L</a:t>
+            </a:r>
+            <a:r>
+              <a:rPr lang="en-US" dirty="0"/>
+              <a:t> </a:t>
+            </a:r>
+            <a:r>
+              <a:rPr lang="en-US" b="1" dirty="0"/>
+              <a:t>E</a:t>
+            </a:r>
+            <a:r>
+              <a:rPr lang="en-US" dirty="0"/>
+              <a:t>xplanations and </a:t>
+            </a:r>
+            <a:r>
+              <a:rPr lang="en-US" b="1" dirty="0"/>
+              <a:t>A</a:t>
+            </a:r>
+            <a:r>
+              <a:rPr lang="en-US" dirty="0"/>
+              <a:t>lgorithmic </a:t>
+            </a:r>
+            <a:r>
+              <a:rPr lang="en-US" b="1" dirty="0"/>
+              <a:t>R</a:t>
+            </a:r>
+            <a:r>
+              <a:rPr lang="en-US" dirty="0"/>
+              <a:t>ecourse in Julia: </a:t>
+            </a:r>
+            <a:r>
+              <a:rPr lang="en-US" dirty="0" err="1"/>
+              <a:t>CLEAR.jl</a:t>
             </a:r>
             <a:r>
               <a:rPr lang="en-US" dirty="0"/>
@@ -1842,35 +1894,7 @@
             </a:pPr>
             <a:r>
               <a:rPr lang="en-US" dirty="0"/>
-              <a:t>Ran experiments investigating the dynamics of AR.</a:t>
-            </a:r>
-            <a:endParaRPr dirty="0"/>
-          </a:p>
-          <a:p>
-            <a:pPr marL="342900" indent="-342900">
-              <a:lnSpc>
-                <a:spcPct val="120000"/>
-              </a:lnSpc>
-              <a:buSzPct val="100000"/>
-              <a:buFont typeface="Arial"/>
-              <a:buChar char="•"/>
-              <a:defRPr sz="2100">
-                <a:solidFill>
-                  <a:srgbClr val="344854"/>
-                </a:solidFill>
-                <a:latin typeface="Arial"/>
-                <a:ea typeface="Arial"/>
-                <a:cs typeface="Arial"/>
-                <a:sym typeface="Arial"/>
-              </a:defRPr>
-            </a:pPr>
-            <a:r>
-              <a:rPr lang="en-US" dirty="0"/>
-              <a:t>Proposed a related research </a:t>
-            </a:r>
-            <a:r>
-              <a:rPr lang="en-US"/>
-              <a:t>project to bachelor’s students.</a:t>
+              <a:t>Have run experiments investigating the dynamics of AR and proposed a related research project to bachelor’s students.</a:t>
             </a:r>
             <a:endParaRPr dirty="0"/>
           </a:p>
@@ -1895,7 +1919,7 @@
           </a:ln>
           <a:extLst>
             <a:ext uri="{C572A759-6A51-4108-AA02-DFA0A04FC94B}">
-              <ma14:wrappingTextBoxFlag xmlns:ma14="http://schemas.microsoft.com/office/mac/drawingml/2011/main" xmlns:a14="http://schemas.microsoft.com/office/drawing/2010/main" xmlns:m="http://schemas.openxmlformats.org/officeDocument/2006/math" xmlns="" val="1"/>
+              <ma14:wrappingTextBoxFlag xmlns="" xmlns:m="http://schemas.openxmlformats.org/officeDocument/2006/math" xmlns:a14="http://schemas.microsoft.com/office/drawing/2010/main" xmlns:ma14="http://schemas.microsoft.com/office/mac/drawingml/2011/main" val="1"/>
             </a:ext>
           </a:extLst>
         </p:spPr>
@@ -1916,7 +1940,7 @@
           <a:p>
             <a:r>
               <a:rPr lang="en-US" dirty="0"/>
-              <a:t>… to realistic recourse for Bayesian models.</a:t>
+              <a:t>… to realistic recourse.</a:t>
             </a:r>
             <a:endParaRPr dirty="0"/>
           </a:p>
@@ -1930,7 +1954,7 @@
         </p:nvSpPr>
         <p:spPr>
           <a:xfrm>
-            <a:off x="11880670" y="4326744"/>
+            <a:off x="11880669" y="4083604"/>
             <a:ext cx="9064533" cy="415498"/>
           </a:xfrm>
           <a:prstGeom prst="rect">
@@ -1941,7 +1965,7 @@
           </a:ln>
           <a:extLst>
             <a:ext uri="{C572A759-6A51-4108-AA02-DFA0A04FC94B}">
-              <ma14:wrappingTextBoxFlag xmlns:ma14="http://schemas.microsoft.com/office/mac/drawingml/2011/main" xmlns:a14="http://schemas.microsoft.com/office/drawing/2010/main" xmlns:m="http://schemas.openxmlformats.org/officeDocument/2006/math" xmlns="" val="1"/>
+              <ma14:wrappingTextBoxFlag xmlns="" xmlns:m="http://schemas.openxmlformats.org/officeDocument/2006/math" xmlns:a14="http://schemas.microsoft.com/office/drawing/2010/main" xmlns:ma14="http://schemas.microsoft.com/office/mac/drawingml/2011/main" val="1"/>
             </a:ext>
           </a:extLst>
         </p:spPr>
@@ -1962,7 +1986,7 @@
           <a:p>
             <a:r>
               <a:rPr lang="en-US" dirty="0"/>
-              <a:t>Empirical evidence</a:t>
+              <a:t>CE through minimizing predictive uncertainty </a:t>
             </a:r>
             <a:endParaRPr dirty="0"/>
           </a:p>
@@ -1976,7 +2000,7 @@
         </p:nvSpPr>
         <p:spPr>
           <a:xfrm>
-            <a:off x="986246" y="11202393"/>
+            <a:off x="968275" y="11440316"/>
             <a:ext cx="9064534" cy="615553"/>
           </a:xfrm>
           <a:prstGeom prst="rect">
@@ -1987,7 +2011,7 @@
           </a:ln>
           <a:extLst>
             <a:ext uri="{C572A759-6A51-4108-AA02-DFA0A04FC94B}">
-              <ma14:wrappingTextBoxFlag xmlns:ma14="http://schemas.microsoft.com/office/mac/drawingml/2011/main" xmlns:a14="http://schemas.microsoft.com/office/drawing/2010/main" xmlns:m="http://schemas.openxmlformats.org/officeDocument/2006/math" xmlns="" val="1"/>
+              <ma14:wrappingTextBoxFlag xmlns="" xmlns:m="http://schemas.openxmlformats.org/officeDocument/2006/math" xmlns:a14="http://schemas.microsoft.com/office/drawing/2010/main" xmlns:ma14="http://schemas.microsoft.com/office/mac/drawingml/2011/main" val="1"/>
             </a:ext>
           </a:extLst>
         </p:spPr>
@@ -2022,7 +2046,7 @@
         </p:nvSpPr>
         <p:spPr>
           <a:xfrm>
-            <a:off x="986246" y="11905511"/>
+            <a:off x="986246" y="11969334"/>
             <a:ext cx="9064534" cy="415498"/>
           </a:xfrm>
           <a:prstGeom prst="rect">
@@ -2033,7 +2057,7 @@
           </a:ln>
           <a:extLst>
             <a:ext uri="{C572A759-6A51-4108-AA02-DFA0A04FC94B}">
-              <ma14:wrappingTextBoxFlag xmlns:ma14="http://schemas.microsoft.com/office/mac/drawingml/2011/main" xmlns:a14="http://schemas.microsoft.com/office/drawing/2010/main" xmlns:m="http://schemas.openxmlformats.org/officeDocument/2006/math" xmlns="" val="1"/>
+              <ma14:wrappingTextBoxFlag xmlns="" xmlns:m="http://schemas.openxmlformats.org/officeDocument/2006/math" xmlns:a14="http://schemas.microsoft.com/office/drawing/2010/main" xmlns:ma14="http://schemas.microsoft.com/office/mac/drawingml/2011/main" val="1"/>
             </a:ext>
           </a:extLst>
         </p:spPr>
@@ -2054,7 +2078,7 @@
           <a:p>
             <a:r>
               <a:rPr lang="en-US" dirty="0"/>
-              <a:t>A simple methodology</a:t>
+              <a:t>A light-hearted motivating example</a:t>
             </a:r>
             <a:endParaRPr dirty="0"/>
           </a:p>
@@ -2068,8 +2092,8 @@
         </p:nvSpPr>
         <p:spPr>
           <a:xfrm>
-            <a:off x="986246" y="12632281"/>
-            <a:ext cx="9064534" cy="2383473"/>
+            <a:off x="986246" y="12467989"/>
+            <a:ext cx="9064534" cy="1995675"/>
           </a:xfrm>
           <a:prstGeom prst="rect">
             <a:avLst/>
@@ -2079,7 +2103,7 @@
           </a:ln>
           <a:extLst>
             <a:ext uri="{C572A759-6A51-4108-AA02-DFA0A04FC94B}">
-              <ma14:wrappingTextBoxFlag xmlns:ma14="http://schemas.microsoft.com/office/mac/drawingml/2011/main" xmlns:a14="http://schemas.microsoft.com/office/drawing/2010/main" xmlns:m="http://schemas.openxmlformats.org/officeDocument/2006/math" xmlns="" val="1"/>
+              <ma14:wrappingTextBoxFlag xmlns="" xmlns:m="http://schemas.openxmlformats.org/officeDocument/2006/math" xmlns:a14="http://schemas.microsoft.com/office/drawing/2010/main" xmlns:ma14="http://schemas.microsoft.com/office/mac/drawingml/2011/main" val="1"/>
             </a:ext>
           </a:extLst>
         </p:spPr>
@@ -2106,32 +2130,13 @@
           <a:p>
             <a:r>
               <a:rPr lang="en-US" dirty="0"/>
-              <a:t>We developed our idea under the following premise: </a:t>
-            </a:r>
-            <a:r>
-              <a:rPr lang="en-US" b="1" dirty="0" err="1"/>
-              <a:t>maximise</a:t>
-            </a:r>
-            <a:r>
-              <a:rPr lang="en-US" b="1" dirty="0"/>
-              <a:t> performance</a:t>
-            </a:r>
-            <a:r>
-              <a:rPr lang="en-US" dirty="0"/>
-              <a:t> of an existing and trusted framework under </a:t>
-            </a:r>
-            <a:r>
-              <a:rPr lang="en-US" b="1" dirty="0"/>
-              <a:t>minimal intervention</a:t>
-            </a:r>
-            <a:r>
-              <a:rPr lang="en-US" dirty="0"/>
-              <a:t>. </a:t>
-            </a:r>
-            <a:r>
-              <a:rPr lang="en-GB" dirty="0"/>
-              <a:t>VAR has become a standard tool for practitioners to construct economic forecasts, but the assumption of linearity through time and variables is restrictive. We relax that assumption through one simple step: estimate each system equation through a recurrent neural network.</a:t>
-            </a:r>
+              <a:t>Suppose we have fitted some black box classifier to divide cats and dogs based on two features: height and tail length. One individual cat – let’s call her Kitty </a:t>
+            </a:r>
+            <a:r>
+              <a:rPr lang="en-NL" dirty="0"/>
+              <a:t>🐱 – is friends with a lot of cool dogs and wants to remain part of that group. The counterfactual path below shows how 🐱 needs to change her appearance in order to be allocated to the group of dogs by the system.</a:t>
+            </a:r>
+            <a:endParaRPr lang="en-GB" dirty="0"/>
           </a:p>
         </p:txBody>
       </p:sp>
@@ -2143,7 +2148,7 @@
         </p:nvSpPr>
         <p:spPr>
           <a:xfrm>
-            <a:off x="22833818" y="11199753"/>
+            <a:off x="22830664" y="13813518"/>
             <a:ext cx="9029701" cy="615553"/>
           </a:xfrm>
           <a:prstGeom prst="rect">
@@ -2154,7 +2159,7 @@
           </a:ln>
           <a:extLst>
             <a:ext uri="{C572A759-6A51-4108-AA02-DFA0A04FC94B}">
-              <ma14:wrappingTextBoxFlag xmlns:ma14="http://schemas.microsoft.com/office/mac/drawingml/2011/main" xmlns:a14="http://schemas.microsoft.com/office/drawing/2010/main" xmlns:m="http://schemas.openxmlformats.org/officeDocument/2006/math" xmlns="" val="1"/>
+              <ma14:wrappingTextBoxFlag xmlns="" xmlns:m="http://schemas.openxmlformats.org/officeDocument/2006/math" xmlns:a14="http://schemas.microsoft.com/office/drawing/2010/main" xmlns:ma14="http://schemas.microsoft.com/office/mac/drawingml/2011/main" val="1"/>
             </a:ext>
           </a:extLst>
         </p:spPr>
@@ -2176,52 +2181,6 @@
             <a:r>
               <a:rPr lang="en-US" dirty="0"/>
               <a:t>Where to go from here</a:t>
-            </a:r>
-            <a:endParaRPr dirty="0"/>
-          </a:p>
-        </p:txBody>
-      </p:sp>
-      <p:sp>
-        <p:nvSpPr>
-          <p:cNvPr id="43" name="TextBox 52"/>
-          <p:cNvSpPr txBox="1"/>
-          <p:nvPr/>
-        </p:nvSpPr>
-        <p:spPr>
-          <a:xfrm>
-            <a:off x="22833818" y="11962892"/>
-            <a:ext cx="9029701" cy="415498"/>
-          </a:xfrm>
-          <a:prstGeom prst="rect">
-            <a:avLst/>
-          </a:prstGeom>
-          <a:ln w="12700">
-            <a:miter lim="400000"/>
-          </a:ln>
-          <a:extLst>
-            <a:ext uri="{C572A759-6A51-4108-AA02-DFA0A04FC94B}">
-              <ma14:wrappingTextBoxFlag xmlns:ma14="http://schemas.microsoft.com/office/mac/drawingml/2011/main" xmlns:a14="http://schemas.microsoft.com/office/drawing/2010/main" xmlns:m="http://schemas.openxmlformats.org/officeDocument/2006/math" xmlns="" val="1"/>
-            </a:ext>
-          </a:extLst>
-        </p:spPr>
-        <p:txBody>
-          <a:bodyPr lIns="45719" rIns="45719">
-            <a:spAutoFit/>
-          </a:bodyPr>
-          <a:lstStyle>
-            <a:lvl1pPr>
-              <a:defRPr sz="2100">
-                <a:latin typeface="Arial"/>
-                <a:ea typeface="Arial"/>
-                <a:cs typeface="Arial"/>
-                <a:sym typeface="Arial"/>
-              </a:defRPr>
-            </a:lvl1pPr>
-          </a:lstStyle>
-          <a:p>
-            <a:r>
-              <a:rPr lang="en-US" dirty="0"/>
-              <a:t>Recent work</a:t>
             </a:r>
             <a:endParaRPr dirty="0"/>
           </a:p>
@@ -2246,7 +2205,7 @@
           </a:ln>
           <a:extLst>
             <a:ext uri="{C572A759-6A51-4108-AA02-DFA0A04FC94B}">
-              <ma14:wrappingTextBoxFlag xmlns:ma14="http://schemas.microsoft.com/office/mac/drawingml/2011/main" xmlns:a14="http://schemas.microsoft.com/office/drawing/2010/main" xmlns:m="http://schemas.openxmlformats.org/officeDocument/2006/math" xmlns="" val="1"/>
+              <ma14:wrappingTextBoxFlag xmlns="" xmlns:m="http://schemas.openxmlformats.org/officeDocument/2006/math" xmlns:a14="http://schemas.microsoft.com/office/drawing/2010/main" xmlns:ma14="http://schemas.microsoft.com/office/mac/drawingml/2011/main" val="1"/>
             </a:ext>
           </a:extLst>
         </p:spPr>
@@ -2277,15 +2236,7 @@
             </a:pPr>
             <a:r>
               <a:rPr lang="en-US" dirty="0"/>
-              <a:t>What </a:t>
-            </a:r>
-            <a:r>
-              <a:rPr lang="en-US" b="1" dirty="0"/>
-              <a:t>other benchmark models </a:t>
-            </a:r>
-            <a:r>
-              <a:rPr lang="en-US" dirty="0"/>
-              <a:t>should we consider?</a:t>
+              <a:t>How much of an issue is this really? Can we think of real-world examples where scope for discrimination may lead to undesirable outcomes?</a:t>
             </a:r>
           </a:p>
           <a:p>
@@ -2294,20 +2245,8 @@
               <a:buChar char="•"/>
             </a:pPr>
             <a:r>
-              <a:rPr lang="en-US" b="1" dirty="0"/>
-              <a:t>Structural identification </a:t>
-            </a:r>
-            <a:r>
               <a:rPr lang="en-US" dirty="0"/>
-              <a:t>– how to proceed? </a:t>
-            </a:r>
-            <a:r>
-              <a:rPr lang="en-US" dirty="0" err="1"/>
-              <a:t>Verstyuk</a:t>
-            </a:r>
-            <a:r>
-              <a:rPr lang="en-US" dirty="0"/>
-              <a:t> (2020) works with Cholesky decomposition as in conventional VAR.</a:t>
+              <a:t>How does the magnitude of domain and model shifts vary across different approaches to generating AR? (student project)</a:t>
             </a:r>
           </a:p>
           <a:p>
@@ -2317,25 +2256,7 @@
             </a:pPr>
             <a:r>
               <a:rPr lang="en-US" dirty="0"/>
-              <a:t>Can the existing toolbox (IRFs, variance decomposition, policy counterfactuals, …) be derived for Deep VAR?</a:t>
-            </a:r>
-          </a:p>
-          <a:p>
-            <a:pPr marL="342900" indent="-342900">
-              <a:buFont typeface="Arial" panose="020B0604020202020204" pitchFamily="34" charset="0"/>
-              <a:buChar char="•"/>
-            </a:pPr>
-            <a:r>
-              <a:rPr lang="en-US" dirty="0"/>
-              <a:t>Deep VAR as a </a:t>
-            </a:r>
-            <a:r>
-              <a:rPr lang="en-US" b="1" dirty="0"/>
-              <a:t>tool for detecting non-linearities</a:t>
-            </a:r>
-            <a:r>
-              <a:rPr lang="en-US" dirty="0"/>
-              <a:t>?</a:t>
+              <a:t>Can we assess what factors mitigate endogenous shifts when generating recourse? </a:t>
             </a:r>
           </a:p>
           <a:p>
@@ -2366,7 +2287,7 @@
           </a:ln>
           <a:extLst>
             <a:ext uri="{C572A759-6A51-4108-AA02-DFA0A04FC94B}">
-              <ma14:wrappingTextBoxFlag xmlns:ma14="http://schemas.microsoft.com/office/mac/drawingml/2011/main" xmlns:a14="http://schemas.microsoft.com/office/drawing/2010/main" xmlns:m="http://schemas.openxmlformats.org/officeDocument/2006/math" xmlns="" val="1"/>
+              <ma14:wrappingTextBoxFlag xmlns="" xmlns:m="http://schemas.openxmlformats.org/officeDocument/2006/math" xmlns:a14="http://schemas.microsoft.com/office/drawing/2010/main" xmlns:ma14="http://schemas.microsoft.com/office/mac/drawingml/2011/main" val="1"/>
             </a:ext>
           </a:extLst>
         </p:spPr>
@@ -2400,8 +2321,8 @@
         </p:nvSpPr>
         <p:spPr>
           <a:xfrm>
-            <a:off x="22905719" y="17903725"/>
-            <a:ext cx="6335025" cy="2626168"/>
+            <a:off x="22875503" y="18054665"/>
+            <a:ext cx="8876668" cy="1323952"/>
           </a:xfrm>
           <a:prstGeom prst="rect">
             <a:avLst/>
@@ -2411,12 +2332,12 @@
           </a:ln>
           <a:extLst>
             <a:ext uri="{C572A759-6A51-4108-AA02-DFA0A04FC94B}">
-              <ma14:wrappingTextBoxFlag xmlns:ma14="http://schemas.microsoft.com/office/mac/drawingml/2011/main" xmlns:a14="http://schemas.microsoft.com/office/drawing/2010/main" xmlns:m="http://schemas.openxmlformats.org/officeDocument/2006/math" xmlns="" val="1"/>
+              <ma14:wrappingTextBoxFlag xmlns="" xmlns:m="http://schemas.openxmlformats.org/officeDocument/2006/math" xmlns:a14="http://schemas.microsoft.com/office/drawing/2010/main" xmlns:ma14="http://schemas.microsoft.com/office/mac/drawingml/2011/main" val="1"/>
             </a:ext>
           </a:extLst>
         </p:spPr>
         <p:txBody>
-          <a:bodyPr lIns="45719" rIns="45719" anchor="b">
+          <a:bodyPr wrap="square" lIns="45719" rIns="45719" anchor="b">
             <a:spAutoFit/>
           </a:bodyPr>
           <a:lstStyle/>
@@ -2436,59 +2357,41 @@
               </a:defRPr>
             </a:pPr>
             <a:r>
-              <a:rPr lang="en-GB" sz="1400" dirty="0" err="1">
+              <a:rPr lang="en-GB" sz="1600" dirty="0">
                 <a:sym typeface="Arial"/>
               </a:rPr>
-              <a:t>Daxberger</a:t>
-            </a:r>
-            <a:r>
-              <a:rPr lang="en-GB" sz="1400" dirty="0">
-                <a:sym typeface="Arial"/>
-              </a:rPr>
-              <a:t> et al. </a:t>
-            </a:r>
-            <a:r>
-              <a:rPr dirty="0"/>
+              <a:t>Wachter et al. </a:t>
+            </a:r>
+            <a:r>
+              <a:rPr sz="1600" dirty="0"/>
               <a:t>(20</a:t>
             </a:r>
             <a:r>
-              <a:rPr lang="en-US" dirty="0"/>
-              <a:t>21</a:t>
-            </a:r>
-            <a:r>
-              <a:rPr dirty="0"/>
+              <a:rPr lang="en-US" sz="1600" dirty="0"/>
+              <a:t>18</a:t>
+            </a:r>
+            <a:r>
+              <a:rPr sz="1600" dirty="0"/>
               <a:t>). “</a:t>
             </a:r>
             <a:r>
-              <a:rPr lang="en-US" dirty="0"/>
-              <a:t>L</a:t>
-            </a:r>
-            <a:r>
-              <a:rPr lang="en-GB" sz="1400" dirty="0" err="1">
-                <a:sym typeface="Arial"/>
-              </a:rPr>
-              <a:t>aplace</a:t>
-            </a:r>
-            <a:r>
-              <a:rPr lang="en-GB" sz="1400" dirty="0">
-                <a:sym typeface="Arial"/>
-              </a:rPr>
-              <a:t> Redux-Effortless Bayesian Deep Learning</a:t>
-            </a:r>
-            <a:r>
-              <a:rPr dirty="0"/>
+              <a:rPr lang="en-US" sz="1600" dirty="0"/>
+              <a:t>Counterfactual explanations without opening the black box: automated decisions and the GDPR</a:t>
+            </a:r>
+            <a:r>
+              <a:rPr sz="1600" dirty="0"/>
               <a:t>.”</a:t>
             </a:r>
             <a:r>
-              <a:rPr lang="en-US" dirty="0"/>
+              <a:rPr lang="en-US" sz="1600" dirty="0"/>
               <a:t>.</a:t>
             </a:r>
             <a:r>
-              <a:rPr dirty="0"/>
+              <a:rPr sz="1600" dirty="0"/>
               <a:t> </a:t>
             </a:r>
             <a:r>
-              <a:rPr lang="en-US" sz="1400" dirty="0">
+              <a:rPr lang="en-US" sz="1600" dirty="0">
                 <a:solidFill>
                   <a:srgbClr val="677B8C"/>
                 </a:solidFill>
@@ -2498,7 +2401,7 @@
               <a:t>In: </a:t>
             </a:r>
             <a:r>
-              <a:rPr lang="en-GB" sz="1400" dirty="0">
+              <a:rPr lang="en-GB" sz="1600" dirty="0">
                 <a:solidFill>
                   <a:srgbClr val="677B8C"/>
                 </a:solidFill>
@@ -2506,15 +2409,8 @@
                 <a:cs typeface="Arial"/>
                 <a:sym typeface="Arial"/>
               </a:rPr>
-              <a:t>Advances in Neural Information Processing Systems 34</a:t>
-            </a:r>
-            <a:endParaRPr sz="1400" dirty="0">
-              <a:solidFill>
-                <a:srgbClr val="677B8C"/>
-              </a:solidFill>
-              <a:latin typeface="Arial"/>
-              <a:cs typeface="Arial"/>
-            </a:endParaRPr>
+              <a:t>Harvard Journal of Law &amp; Technology (31)</a:t>
+            </a:r>
           </a:p>
           <a:p>
             <a:pPr>
@@ -2532,59 +2428,41 @@
               </a:defRPr>
             </a:pPr>
             <a:r>
-              <a:rPr lang="en-US" dirty="0"/>
-              <a:t>Gal and </a:t>
-            </a:r>
-            <a:r>
-              <a:rPr lang="en-US" dirty="0" err="1"/>
-              <a:t>Ghaharamani</a:t>
-            </a:r>
-            <a:r>
-              <a:rPr lang="en-US" dirty="0"/>
-              <a:t> </a:t>
-            </a:r>
-            <a:r>
-              <a:rPr dirty="0"/>
-              <a:t>(201</a:t>
-            </a:r>
-            <a:r>
-              <a:rPr lang="en-US" dirty="0"/>
-              <a:t>6</a:t>
-            </a:r>
-            <a:r>
-              <a:rPr dirty="0"/>
-              <a:t>). “</a:t>
-            </a:r>
-            <a:r>
-              <a:rPr lang="en-GB" sz="1400" dirty="0">
+              <a:rPr lang="en-GB" sz="1600" dirty="0" err="1">
                 <a:sym typeface="Arial"/>
               </a:rPr>
-              <a:t>Dropout as a Bayesian Approximation: Representing Model Uncertainty in Deep Learning</a:t>
-            </a:r>
-            <a:r>
-              <a:rPr dirty="0"/>
-              <a:t>.”. </a:t>
-            </a:r>
-            <a:r>
-              <a:rPr dirty="0">
-                <a:solidFill>
-                  <a:srgbClr val="677B8C"/>
-                </a:solidFill>
+              <a:t>Schut</a:t>
+            </a:r>
+            <a:r>
+              <a:rPr lang="en-GB" sz="1600" dirty="0">
+                <a:sym typeface="Arial"/>
               </a:rPr>
-              <a:t>In:</a:t>
-            </a:r>
-            <a:r>
-              <a:rPr sz="1400" dirty="0">
+              <a:t> et al. </a:t>
+            </a:r>
+            <a:r>
+              <a:rPr lang="en-GB" sz="1600" dirty="0"/>
+              <a:t>(2021). “Generating interpretable counterfactual explanations by implicit minimisation of epistemic and </a:t>
+            </a:r>
+            <a:r>
+              <a:rPr lang="en-GB" sz="1600" dirty="0" err="1"/>
+              <a:t>aleoteric</a:t>
+            </a:r>
+            <a:r>
+              <a:rPr lang="en-GB" sz="1600" dirty="0"/>
+              <a:t> uncertainty.”. </a:t>
+            </a:r>
+            <a:r>
+              <a:rPr lang="en-GB" sz="1600" dirty="0">
                 <a:solidFill>
                   <a:srgbClr val="677B8C"/>
                 </a:solidFill>
                 <a:latin typeface="Arial"/>
                 <a:cs typeface="Arial"/>
               </a:rPr>
-              <a:t> </a:t>
-            </a:r>
-            <a:r>
-              <a:rPr lang="en-GB" sz="1400" dirty="0">
+              <a:t>In: </a:t>
+            </a:r>
+            <a:r>
+              <a:rPr lang="en-GB" sz="1600" dirty="0">
                 <a:solidFill>
                   <a:srgbClr val="677B8C"/>
                 </a:solidFill>
@@ -2592,173 +2470,7 @@
                 <a:cs typeface="Arial"/>
                 <a:sym typeface="Arial"/>
               </a:rPr>
-              <a:t>International Conference on Machine Learning, 1050–59. PMLR. </a:t>
-            </a:r>
-            <a:endParaRPr sz="1400" dirty="0">
-              <a:solidFill>
-                <a:srgbClr val="677B8C"/>
-              </a:solidFill>
-              <a:latin typeface="Arial"/>
-              <a:cs typeface="Arial"/>
-            </a:endParaRPr>
-          </a:p>
-          <a:p>
-            <a:pPr>
-              <a:lnSpc>
-                <a:spcPct val="120000"/>
-              </a:lnSpc>
-              <a:spcBef>
-                <a:spcPts val="600"/>
-              </a:spcBef>
-              <a:defRPr sz="1400">
-                <a:latin typeface="Arial"/>
-                <a:ea typeface="Arial"/>
-                <a:cs typeface="Arial"/>
-                <a:sym typeface="Arial"/>
-              </a:defRPr>
-            </a:pPr>
-            <a:r>
-              <a:rPr lang="en-US" dirty="0"/>
-              <a:t>Kilian and </a:t>
-            </a:r>
-            <a:r>
-              <a:rPr lang="en-US" dirty="0" err="1"/>
-              <a:t>Luetkepohl</a:t>
-            </a:r>
-            <a:r>
-              <a:rPr lang="en-US" dirty="0"/>
-              <a:t> </a:t>
-            </a:r>
-            <a:r>
-              <a:rPr dirty="0"/>
-              <a:t>(201</a:t>
-            </a:r>
-            <a:r>
-              <a:rPr lang="en-US" dirty="0"/>
-              <a:t>7</a:t>
-            </a:r>
-            <a:r>
-              <a:rPr dirty="0"/>
-              <a:t>). “</a:t>
-            </a:r>
-            <a:r>
-              <a:rPr lang="en-GB" sz="1400" dirty="0">
-                <a:sym typeface="Arial"/>
-              </a:rPr>
-              <a:t>Structural Vector Autoregressive Analysis</a:t>
-            </a:r>
-            <a:r>
-              <a:rPr lang="en-GB" sz="1400" i="1" dirty="0">
-                <a:sym typeface="Arial"/>
-              </a:rPr>
-              <a:t>.</a:t>
-            </a:r>
-            <a:r>
-              <a:rPr dirty="0"/>
-              <a:t>”. </a:t>
-            </a:r>
-            <a:r>
-              <a:rPr dirty="0">
-                <a:solidFill>
-                  <a:srgbClr val="677B8C"/>
-                </a:solidFill>
-              </a:rPr>
-              <a:t>In: </a:t>
-            </a:r>
-            <a:r>
-              <a:rPr lang="en-US" dirty="0">
-                <a:solidFill>
-                  <a:srgbClr val="677B8C"/>
-                </a:solidFill>
-              </a:rPr>
-              <a:t>Cambridge University Press</a:t>
-            </a:r>
-            <a:r>
-              <a:rPr dirty="0">
-                <a:solidFill>
-                  <a:srgbClr val="677B8C"/>
-                </a:solidFill>
-              </a:rPr>
-              <a:t>.</a:t>
-            </a:r>
-          </a:p>
-          <a:p>
-            <a:pPr>
-              <a:lnSpc>
-                <a:spcPct val="120000"/>
-              </a:lnSpc>
-              <a:spcBef>
-                <a:spcPts val="600"/>
-              </a:spcBef>
-              <a:defRPr sz="1400">
-                <a:latin typeface="Arial"/>
-                <a:ea typeface="Arial"/>
-                <a:cs typeface="Arial"/>
-                <a:sym typeface="Arial"/>
-              </a:defRPr>
-            </a:pPr>
-            <a:r>
-              <a:rPr lang="en-US" dirty="0" err="1"/>
-              <a:t>Verstyuk</a:t>
-            </a:r>
-            <a:r>
-              <a:rPr lang="en-US" dirty="0"/>
-              <a:t> </a:t>
-            </a:r>
-            <a:r>
-              <a:rPr dirty="0"/>
-              <a:t>(20</a:t>
-            </a:r>
-            <a:r>
-              <a:rPr lang="en-US" dirty="0"/>
-              <a:t>20</a:t>
-            </a:r>
-            <a:r>
-              <a:rPr dirty="0"/>
-              <a:t>). “</a:t>
-            </a:r>
-            <a:r>
-              <a:rPr lang="en-GB" sz="1400" dirty="0" err="1">
-                <a:sym typeface="Arial"/>
-              </a:rPr>
-              <a:t>Modeling</a:t>
-            </a:r>
-            <a:r>
-              <a:rPr lang="en-GB" sz="1400" dirty="0">
-                <a:sym typeface="Arial"/>
-              </a:rPr>
-              <a:t> Multivariate Time Series in Economics: From Auto-Regressions to Recurrent Neural Networks</a:t>
-            </a:r>
-            <a:r>
-              <a:rPr dirty="0"/>
-              <a:t>.”</a:t>
-            </a:r>
-            <a:r>
-              <a:rPr lang="en-US" dirty="0"/>
-              <a:t>.</a:t>
-            </a:r>
-            <a:r>
-              <a:rPr dirty="0"/>
-              <a:t> </a:t>
-            </a:r>
-            <a:r>
-              <a:rPr dirty="0">
-                <a:solidFill>
-                  <a:srgbClr val="677B8C"/>
-                </a:solidFill>
-              </a:rPr>
-              <a:t>In: </a:t>
-            </a:r>
-            <a:r>
-              <a:rPr lang="en-GB" sz="1400" dirty="0">
-                <a:solidFill>
-                  <a:srgbClr val="677B8C"/>
-                </a:solidFill>
-                <a:latin typeface="Arial"/>
-                <a:cs typeface="Arial"/>
-                <a:sym typeface="Arial"/>
-              </a:rPr>
-              <a:t>Available at SSRN 3589337.</a:t>
+              <a:t>Proceedings of Machine Learning Research (130)</a:t>
             </a:r>
           </a:p>
         </p:txBody>
@@ -2771,7 +2483,7 @@
         </p:nvSpPr>
         <p:spPr>
           <a:xfrm>
-            <a:off x="17483356" y="784521"/>
+            <a:off x="16911570" y="469812"/>
             <a:ext cx="6744281" cy="1190069"/>
           </a:xfrm>
           <a:prstGeom prst="rect">
@@ -2782,7 +2494,7 @@
           </a:ln>
           <a:extLst>
             <a:ext uri="{C572A759-6A51-4108-AA02-DFA0A04FC94B}">
-              <ma14:wrappingTextBoxFlag xmlns:ma14="http://schemas.microsoft.com/office/mac/drawingml/2011/main" xmlns:a14="http://schemas.microsoft.com/office/drawing/2010/main" xmlns:m="http://schemas.openxmlformats.org/officeDocument/2006/math" xmlns="" val="1"/>
+              <ma14:wrappingTextBoxFlag xmlns="" xmlns:m="http://schemas.openxmlformats.org/officeDocument/2006/math" xmlns:a14="http://schemas.microsoft.com/office/drawing/2010/main" xmlns:ma14="http://schemas.microsoft.com/office/mac/drawingml/2011/main" val="1"/>
             </a:ext>
           </a:extLst>
         </p:spPr>
@@ -2861,7 +2573,7 @@
         </p:nvSpPr>
         <p:spPr>
           <a:xfrm>
-            <a:off x="968275" y="9183189"/>
+            <a:off x="968275" y="8997523"/>
             <a:ext cx="9064534" cy="415498"/>
           </a:xfrm>
           <a:prstGeom prst="rect">
@@ -2872,7 +2584,7 @@
           </a:ln>
           <a:extLst>
             <a:ext uri="{C572A759-6A51-4108-AA02-DFA0A04FC94B}">
-              <ma14:wrappingTextBoxFlag xmlns:ma14="http://schemas.microsoft.com/office/mac/drawingml/2011/main" xmlns:a14="http://schemas.microsoft.com/office/drawing/2010/main" xmlns:m="http://schemas.openxmlformats.org/officeDocument/2006/math" xmlns="" val="1"/>
+              <ma14:wrappingTextBoxFlag xmlns="" xmlns:m="http://schemas.openxmlformats.org/officeDocument/2006/math" xmlns:a14="http://schemas.microsoft.com/office/drawing/2010/main" xmlns:ma14="http://schemas.microsoft.com/office/mac/drawingml/2011/main" val="1"/>
             </a:ext>
           </a:extLst>
         </p:spPr>
@@ -2893,7 +2605,7 @@
           <a:p>
             <a:r>
               <a:rPr lang="en-US" dirty="0"/>
-              <a:t>My work so far:</a:t>
+              <a:t>Our work so far:</a:t>
             </a:r>
             <a:endParaRPr dirty="0"/>
           </a:p>
@@ -2913,10 +2625,10 @@
         </p:nvGrpSpPr>
         <p:grpSpPr>
           <a:xfrm>
-            <a:off x="1003662" y="15344587"/>
-            <a:ext cx="9029701" cy="5099762"/>
-            <a:chOff x="1003662" y="15344587"/>
-            <a:chExt cx="9029701" cy="5099762"/>
+            <a:off x="1038495" y="14804741"/>
+            <a:ext cx="9029701" cy="5436625"/>
+            <a:chOff x="1229881" y="14856114"/>
+            <a:chExt cx="9029701" cy="5436625"/>
           </a:xfrm>
           <a:effectLst>
             <a:outerShdw blurRad="50800" dist="38100" dir="2700000" algn="tl" rotWithShape="0">
@@ -2935,7 +2647,7 @@
           </p:nvSpPr>
           <p:spPr>
             <a:xfrm>
-              <a:off x="1003662" y="20151961"/>
+              <a:off x="1229881" y="20000351"/>
               <a:ext cx="9029701" cy="292388"/>
             </a:xfrm>
             <a:prstGeom prst="rect">
@@ -2946,7 +2658,7 @@
             </a:ln>
             <a:extLst>
               <a:ext uri="{C572A759-6A51-4108-AA02-DFA0A04FC94B}">
-                <ma14:wrappingTextBoxFlag xmlns:ma14="http://schemas.microsoft.com/office/mac/drawingml/2011/main" xmlns:a14="http://schemas.microsoft.com/office/drawing/2010/main" xmlns:m="http://schemas.openxmlformats.org/officeDocument/2006/math" xmlns="" val="1"/>
+                <ma14:wrappingTextBoxFlag xmlns="" xmlns:m="http://schemas.openxmlformats.org/officeDocument/2006/math" xmlns:a14="http://schemas.microsoft.com/office/drawing/2010/main" xmlns:ma14="http://schemas.microsoft.com/office/mac/drawingml/2011/main" val="1"/>
               </a:ext>
             </a:extLst>
           </p:spPr>
@@ -2970,22 +2682,22 @@
             <a:p>
               <a:r>
                 <a:rPr lang="en-GB" dirty="0"/>
-                <a:t>Figure 1: Neural Network Architecture. Inputs are lags of all variables. Output is variable of interest in time </a:t>
+                <a:t>Figure 1: Generating recourse for </a:t>
               </a:r>
               <a:r>
-                <a:rPr lang="en-GB" i="1" dirty="0"/>
-                <a:t>t</a:t>
+                <a:rPr lang="en-NL" dirty="0"/>
+                <a:t>🐱 following Wachter et al. (2018)</a:t>
               </a:r>
               <a:r>
                 <a:rPr lang="en-GB" dirty="0"/>
-                <a:t>.</a:t>
+                <a:t>. Contour shows the predictions of a simple MLP.</a:t>
               </a:r>
             </a:p>
           </p:txBody>
         </p:sp>
         <p:pic>
           <p:nvPicPr>
-            <p:cNvPr id="1027" name="Picture 3" descr="page12image8536688">
+            <p:cNvPr id="1027" name="Picture 3">
               <a:extLst>
                 <a:ext uri="{FF2B5EF4-FFF2-40B4-BE49-F238E27FC236}">
                   <a16:creationId xmlns:a16="http://schemas.microsoft.com/office/drawing/2014/main" id="{1380E7DC-4C80-4E4C-8C15-86419506E7A4}"/>
@@ -3006,14 +2718,12 @@
               </a:extLst>
             </a:blip>
             <a:srcRect/>
-            <a:stretch>
-              <a:fillRect/>
-            </a:stretch>
+            <a:stretch/>
           </p:blipFill>
           <p:spPr bwMode="auto">
             <a:xfrm>
-              <a:off x="2728979" y="15344587"/>
-              <a:ext cx="5589794" cy="4754363"/>
+              <a:off x="2297611" y="14856114"/>
+              <a:ext cx="6788634" cy="5091476"/>
             </a:xfrm>
             <a:prstGeom prst="rect">
               <a:avLst/>
@@ -3045,10 +2755,10 @@
         </p:nvGrpSpPr>
         <p:grpSpPr>
           <a:xfrm>
-            <a:off x="11932848" y="13246663"/>
-            <a:ext cx="9013731" cy="2190699"/>
-            <a:chOff x="11911401" y="11052761"/>
-            <a:chExt cx="9365058" cy="2253669"/>
+            <a:off x="12033069" y="14426941"/>
+            <a:ext cx="8690955" cy="2084298"/>
+            <a:chOff x="12072172" y="11362137"/>
+            <a:chExt cx="9029701" cy="2144208"/>
           </a:xfrm>
           <a:effectLst>
             <a:outerShdw blurRad="50800" dist="38100" dir="2700000" algn="tl" rotWithShape="0">
@@ -3067,8 +2777,8 @@
           </p:nvSpPr>
           <p:spPr>
             <a:xfrm>
-              <a:off x="12074061" y="13014042"/>
-              <a:ext cx="9029701" cy="292388"/>
+              <a:off x="12072172" y="12999747"/>
+              <a:ext cx="9029701" cy="506598"/>
             </a:xfrm>
             <a:prstGeom prst="rect">
               <a:avLst/>
@@ -3078,7 +2788,7 @@
             </a:ln>
             <a:extLst>
               <a:ext uri="{C572A759-6A51-4108-AA02-DFA0A04FC94B}">
-                <ma14:wrappingTextBoxFlag xmlns:ma14="http://schemas.microsoft.com/office/mac/drawingml/2011/main" xmlns:a14="http://schemas.microsoft.com/office/drawing/2010/main" xmlns:m="http://schemas.openxmlformats.org/officeDocument/2006/math" xmlns="" val="1"/>
+                <ma14:wrappingTextBoxFlag xmlns="" xmlns:m="http://schemas.openxmlformats.org/officeDocument/2006/math" xmlns:a14="http://schemas.microsoft.com/office/drawing/2010/main" xmlns:ma14="http://schemas.microsoft.com/office/mac/drawingml/2011/main" val="1"/>
               </a:ext>
             </a:extLst>
           </p:spPr>
@@ -3102,11 +2812,11 @@
             <a:p>
               <a:r>
                 <a:rPr lang="en-US" dirty="0"/>
-                <a:t>Figure 2: </a:t>
+                <a:t>Figure 3: Turning a 9 into a 4: </a:t>
               </a:r>
               <a:r>
                 <a:rPr lang="en-GB" dirty="0"/>
-                <a:t>Comparison of cumulative loss over the entire sample period for Deep VAR and benchmarks.</a:t>
+                <a:t>counterfactual explanations for MNIST data. For the MLP counterfactuals look like adversarial attacks. Counterfactuals for the deep ensemble are arguably much better.</a:t>
               </a:r>
               <a:endParaRPr dirty="0"/>
             </a:p>
@@ -3139,8 +2849,8 @@
           </p:blipFill>
           <p:spPr bwMode="auto">
             <a:xfrm>
-              <a:off x="11911401" y="11052761"/>
-              <a:ext cx="9365058" cy="1854565"/>
+              <a:off x="12496027" y="11362137"/>
+              <a:ext cx="8236298" cy="1631036"/>
             </a:xfrm>
             <a:prstGeom prst="rect">
               <a:avLst/>
@@ -3160,7 +2870,7 @@
       </p:grpSp>
       <p:pic>
         <p:nvPicPr>
-          <p:cNvPr id="4" name="Picture 3" descr="Qr code&#10;&#10;Description automatically generated">
+          <p:cNvPr id="4" name="Picture 3">
             <a:extLst>
               <a:ext uri="{FF2B5EF4-FFF2-40B4-BE49-F238E27FC236}">
                 <a16:creationId xmlns:a16="http://schemas.microsoft.com/office/drawing/2014/main" id="{90366575-11E3-7740-875A-55ABE267778A}"/>
@@ -3180,50 +2890,13 @@
               </a:ext>
             </a:extLst>
           </a:blip>
-          <a:stretch>
-            <a:fillRect/>
-          </a:stretch>
+          <a:srcRect/>
+          <a:stretch/>
         </p:blipFill>
         <p:spPr>
           <a:xfrm>
-            <a:off x="14227784" y="469812"/>
+            <a:off x="11390058" y="408329"/>
             <a:ext cx="2414521" cy="2414521"/>
-          </a:xfrm>
-          <a:prstGeom prst="rect">
-            <a:avLst/>
-          </a:prstGeom>
-        </p:spPr>
-      </p:pic>
-      <p:pic>
-        <p:nvPicPr>
-          <p:cNvPr id="6" name="Picture 5" descr="A picture containing shape&#10;&#10;Description automatically generated">
-            <a:extLst>
-              <a:ext uri="{FF2B5EF4-FFF2-40B4-BE49-F238E27FC236}">
-                <a16:creationId xmlns:a16="http://schemas.microsoft.com/office/drawing/2014/main" id="{43782B00-179B-7C46-99E8-AE3577FA4EDE}"/>
-              </a:ext>
-            </a:extLst>
-          </p:cNvPr>
-          <p:cNvPicPr>
-            <a:picLocks noChangeAspect="1"/>
-          </p:cNvPicPr>
-          <p:nvPr/>
-        </p:nvPicPr>
-        <p:blipFill>
-          <a:blip r:embed="rId6">
-            <a:extLst>
-              <a:ext uri="{28A0092B-C50C-407E-A947-70E740481C1C}">
-                <a14:useLocalDpi xmlns:a14="http://schemas.microsoft.com/office/drawing/2010/main" val="0"/>
-              </a:ext>
-            </a:extLst>
-          </a:blip>
-          <a:stretch>
-            <a:fillRect/>
-          </a:stretch>
-        </p:blipFill>
-        <p:spPr>
-          <a:xfrm>
-            <a:off x="11430000" y="253151"/>
-            <a:ext cx="2334638" cy="2704214"/>
           </a:xfrm>
           <a:prstGeom prst="rect">
             <a:avLst/>
@@ -3244,8 +2917,8 @@
         </p:nvSpPr>
         <p:spPr>
           <a:xfrm>
-            <a:off x="11880670" y="5016731"/>
-            <a:ext cx="9064532" cy="3546868"/>
+            <a:off x="12033069" y="12694639"/>
+            <a:ext cx="9064532" cy="1995675"/>
           </a:xfrm>
           <a:prstGeom prst="rect">
             <a:avLst/>
@@ -3255,7 +2928,7 @@
           </a:ln>
           <a:extLst>
             <a:ext uri="{C572A759-6A51-4108-AA02-DFA0A04FC94B}">
-              <ma14:wrappingTextBoxFlag xmlns:ma14="http://schemas.microsoft.com/office/mac/drawingml/2011/main" xmlns:a14="http://schemas.microsoft.com/office/drawing/2010/main" xmlns:m="http://schemas.openxmlformats.org/officeDocument/2006/math" xmlns="" val="1"/>
+              <ma14:wrappingTextBoxFlag xmlns="" xmlns:m="http://schemas.openxmlformats.org/officeDocument/2006/math" xmlns:a14="http://schemas.microsoft.com/office/drawing/2010/main" xmlns:ma14="http://schemas.microsoft.com/office/mac/drawingml/2011/main" val="1"/>
             </a:ext>
           </a:extLst>
         </p:spPr>
@@ -3282,33 +2955,11 @@
           <a:p>
             <a:r>
               <a:rPr lang="en-GB" dirty="0"/>
-              <a:t>To evaluate our proposed methodology empirically we use the </a:t>
-            </a:r>
-            <a:r>
-              <a:rPr lang="en-GB" b="1" dirty="0"/>
-              <a:t>FRED-MD data base to collect a sample of monthly US data</a:t>
-            </a:r>
-            <a:r>
-              <a:rPr lang="en-GB" dirty="0"/>
-              <a:t> on output (IP), unemployment (UR), inflation (CPI) and interest rates (FFR). Our sample spans the period from January 1959 through March 2021. </a:t>
+              <a:t>The method used to generate the counterfactual in Figure 2 is fast and greedy approach that works by minimizing the predictive uncertainty of Bayesian models. Applied to MNIST data the Bayesian approach generates satisfactory outcomes (Figure 3).</a:t>
             </a:r>
           </a:p>
           <a:p>
             <a:endParaRPr lang="en-GB" dirty="0"/>
-          </a:p>
-          <a:p>
-            <a:r>
-              <a:rPr lang="en-GB" dirty="0"/>
-              <a:t>Our findings show a </a:t>
-            </a:r>
-            <a:r>
-              <a:rPr lang="en-GB" b="1" dirty="0"/>
-              <a:t>consistent and significant improvement in predictive performance</a:t>
-            </a:r>
-            <a:r>
-              <a:rPr lang="en-GB" dirty="0"/>
-              <a:t>: the Deep VAR incurs much lower loss than the conventional benchmark. It also outperforms other popular approaches that address non-linearity (Threshold VAR and Random Forest).</a:t>
-            </a:r>
           </a:p>
         </p:txBody>
       </p:sp>
@@ -3326,10 +2977,10 @@
         </p:nvGrpSpPr>
         <p:grpSpPr>
           <a:xfrm>
-            <a:off x="22792507" y="6982050"/>
-            <a:ext cx="9067858" cy="3961075"/>
-            <a:chOff x="22792507" y="6982050"/>
-            <a:chExt cx="9067858" cy="3961075"/>
+            <a:off x="22752685" y="6932724"/>
+            <a:ext cx="9029701" cy="6434834"/>
+            <a:chOff x="22792506" y="4386974"/>
+            <a:chExt cx="9029701" cy="6434834"/>
           </a:xfrm>
           <a:effectLst>
             <a:outerShdw blurRad="50800" dist="38100" dir="2700000" algn="tl" rotWithShape="0">
@@ -3342,7 +2993,7 @@
         </p:grpSpPr>
         <p:pic>
           <p:nvPicPr>
-            <p:cNvPr id="1032" name="Picture 8" descr="page19image8799872">
+            <p:cNvPr id="1032" name="Picture 8">
               <a:extLst>
                 <a:ext uri="{FF2B5EF4-FFF2-40B4-BE49-F238E27FC236}">
                   <a16:creationId xmlns:a16="http://schemas.microsoft.com/office/drawing/2014/main" id="{79123B7B-BB4E-3C4E-A4F3-8E9B1DF34B82}"/>
@@ -3355,7 +3006,7 @@
             <p:nvPr/>
           </p:nvPicPr>
           <p:blipFill>
-            <a:blip r:embed="rId7">
+            <a:blip r:embed="rId6">
               <a:extLst>
                 <a:ext uri="{28A0092B-C50C-407E-A947-70E740481C1C}">
                   <a14:useLocalDpi xmlns:a14="http://schemas.microsoft.com/office/drawing/2010/main" val="0"/>
@@ -3363,14 +3014,12 @@
               </a:extLst>
             </a:blip>
             <a:srcRect/>
-            <a:stretch>
-              <a:fillRect/>
-            </a:stretch>
+            <a:stretch/>
           </p:blipFill>
           <p:spPr bwMode="auto">
             <a:xfrm>
-              <a:off x="22833818" y="6982050"/>
-              <a:ext cx="9026547" cy="3610619"/>
+              <a:off x="23655918" y="4386974"/>
+              <a:ext cx="7302878" cy="6085731"/>
             </a:xfrm>
             <a:prstGeom prst="rect">
               <a:avLst/>
@@ -3401,7 +3050,7 @@
           </p:nvSpPr>
           <p:spPr>
             <a:xfrm>
-              <a:off x="22792507" y="10650737"/>
+              <a:off x="22792506" y="10529420"/>
               <a:ext cx="9029701" cy="292388"/>
             </a:xfrm>
             <a:prstGeom prst="rect">
@@ -3412,7 +3061,7 @@
             </a:ln>
             <a:extLst>
               <a:ext uri="{C572A759-6A51-4108-AA02-DFA0A04FC94B}">
-                <ma14:wrappingTextBoxFlag xmlns:ma14="http://schemas.microsoft.com/office/mac/drawingml/2011/main" xmlns:a14="http://schemas.microsoft.com/office/drawing/2010/main" xmlns:m="http://schemas.openxmlformats.org/officeDocument/2006/math" xmlns="" val="1"/>
+                <ma14:wrappingTextBoxFlag xmlns="" xmlns:m="http://schemas.openxmlformats.org/officeDocument/2006/math" xmlns:a14="http://schemas.microsoft.com/office/drawing/2010/main" xmlns:ma14="http://schemas.microsoft.com/office/mac/drawingml/2011/main" val="1"/>
               </a:ext>
             </a:extLst>
           </p:spPr>
@@ -3436,7 +3085,7 @@
             <a:p>
               <a:r>
                 <a:rPr lang="en-GB" dirty="0"/>
-                <a:t>Figure 3: Pseudo out-of-sample RMSE and RMSFE for VAR and Deep VAR across different lag choices.</a:t>
+                <a:t>Figure 4: Algorithmic recourse leads to domain and model shifts.</a:t>
               </a:r>
             </a:p>
           </p:txBody>
@@ -3467,7 +3116,7 @@
           </a:ln>
           <a:extLst>
             <a:ext uri="{C572A759-6A51-4108-AA02-DFA0A04FC94B}">
-              <ma14:wrappingTextBoxFlag xmlns:ma14="http://schemas.microsoft.com/office/mac/drawingml/2011/main" xmlns:a14="http://schemas.microsoft.com/office/drawing/2010/main" xmlns:m="http://schemas.openxmlformats.org/officeDocument/2006/math" xmlns="" val="1"/>
+              <ma14:wrappingTextBoxFlag xmlns="" xmlns:m="http://schemas.openxmlformats.org/officeDocument/2006/math" xmlns:a14="http://schemas.microsoft.com/office/drawing/2010/main" xmlns:ma14="http://schemas.microsoft.com/office/mac/drawingml/2011/main" val="1"/>
             </a:ext>
           </a:extLst>
         </p:spPr>
@@ -3488,7 +3137,7 @@
           <a:p>
             <a:r>
               <a:rPr lang="en-US" dirty="0"/>
-              <a:t>Endogenous shifts in algorithmic recourse</a:t>
+              <a:t>The dynamics of Algorithmic Recourse</a:t>
             </a:r>
             <a:endParaRPr dirty="0"/>
           </a:p>
@@ -3508,7 +3157,7 @@
         </p:nvSpPr>
         <p:spPr>
           <a:xfrm>
-            <a:off x="22775092" y="4326744"/>
+            <a:off x="22775091" y="4065799"/>
             <a:ext cx="9064533" cy="415498"/>
           </a:xfrm>
           <a:prstGeom prst="rect">
@@ -3519,7 +3168,7 @@
           </a:ln>
           <a:extLst>
             <a:ext uri="{C572A759-6A51-4108-AA02-DFA0A04FC94B}">
-              <ma14:wrappingTextBoxFlag xmlns:ma14="http://schemas.microsoft.com/office/mac/drawingml/2011/main" xmlns:a14="http://schemas.microsoft.com/office/drawing/2010/main" xmlns:m="http://schemas.openxmlformats.org/officeDocument/2006/math" xmlns="" val="1"/>
+              <ma14:wrappingTextBoxFlag xmlns="" xmlns:m="http://schemas.openxmlformats.org/officeDocument/2006/math" xmlns:a14="http://schemas.microsoft.com/office/drawing/2010/main" xmlns:ma14="http://schemas.microsoft.com/office/mac/drawingml/2011/main" val="1"/>
             </a:ext>
           </a:extLst>
         </p:spPr>
@@ -3540,7 +3189,7 @@
           <a:p>
             <a:r>
               <a:rPr lang="en-US" dirty="0"/>
-              <a:t>Hyperparameter tuning</a:t>
+              <a:t>Endogenous domain and model shifts</a:t>
             </a:r>
             <a:endParaRPr dirty="0"/>
           </a:p>
@@ -3560,7 +3209,7 @@
         </p:nvSpPr>
         <p:spPr>
           <a:xfrm>
-            <a:off x="11910901" y="15468186"/>
+            <a:off x="11871949" y="16736820"/>
             <a:ext cx="9130938" cy="615553"/>
           </a:xfrm>
           <a:prstGeom prst="rect">
@@ -3571,7 +3220,7 @@
           </a:ln>
           <a:extLst>
             <a:ext uri="{C572A759-6A51-4108-AA02-DFA0A04FC94B}">
-              <ma14:wrappingTextBoxFlag xmlns:ma14="http://schemas.microsoft.com/office/mac/drawingml/2011/main" xmlns:a14="http://schemas.microsoft.com/office/drawing/2010/main" xmlns:m="http://schemas.openxmlformats.org/officeDocument/2006/math" xmlns="" val="1"/>
+              <ma14:wrappingTextBoxFlag xmlns="" xmlns:m="http://schemas.openxmlformats.org/officeDocument/2006/math" xmlns:a14="http://schemas.microsoft.com/office/drawing/2010/main" xmlns:ma14="http://schemas.microsoft.com/office/mac/drawingml/2011/main" val="1"/>
             </a:ext>
           </a:extLst>
         </p:spPr>
@@ -3629,7 +3278,7 @@
         </p:nvSpPr>
         <p:spPr>
           <a:xfrm>
-            <a:off x="22830664" y="14440616"/>
+            <a:off x="22830664" y="14313945"/>
             <a:ext cx="9029701" cy="415498"/>
           </a:xfrm>
           <a:prstGeom prst="rect">
@@ -3640,7 +3289,7 @@
           </a:ln>
           <a:extLst>
             <a:ext uri="{C572A759-6A51-4108-AA02-DFA0A04FC94B}">
-              <ma14:wrappingTextBoxFlag xmlns:ma14="http://schemas.microsoft.com/office/mac/drawingml/2011/main" xmlns:a14="http://schemas.microsoft.com/office/drawing/2010/main" xmlns:m="http://schemas.openxmlformats.org/officeDocument/2006/math" xmlns="" val="1"/>
+              <ma14:wrappingTextBoxFlag xmlns="" xmlns:m="http://schemas.openxmlformats.org/officeDocument/2006/math" xmlns:a14="http://schemas.microsoft.com/office/drawing/2010/main" xmlns:ma14="http://schemas.microsoft.com/office/mac/drawingml/2011/main" val="1"/>
             </a:ext>
           </a:extLst>
         </p:spPr>
@@ -3661,104 +3310,9 @@
           <a:p>
             <a:r>
               <a:rPr lang="en-US" dirty="0"/>
-              <a:t>Open questions</a:t>
+              <a:t>Open questions (your thoughts are more than welcome!)</a:t>
             </a:r>
             <a:endParaRPr dirty="0"/>
-          </a:p>
-        </p:txBody>
-      </p:sp>
-      <p:sp>
-        <p:nvSpPr>
-          <p:cNvPr id="63" name="TextBox 41">
-            <a:extLst>
-              <a:ext uri="{FF2B5EF4-FFF2-40B4-BE49-F238E27FC236}">
-                <a16:creationId xmlns:a16="http://schemas.microsoft.com/office/drawing/2014/main" id="{51DB7709-FF89-C44F-B8E5-C315C9AB2220}"/>
-              </a:ext>
-            </a:extLst>
-          </p:cNvPr>
-          <p:cNvSpPr txBox="1"/>
-          <p:nvPr/>
-        </p:nvSpPr>
-        <p:spPr>
-          <a:xfrm>
-            <a:off x="22828647" y="12448854"/>
-            <a:ext cx="9130938" cy="1607876"/>
-          </a:xfrm>
-          <a:prstGeom prst="rect">
-            <a:avLst/>
-          </a:prstGeom>
-          <a:ln w="12700">
-            <a:miter lim="400000"/>
-          </a:ln>
-          <a:extLst>
-            <a:ext uri="{C572A759-6A51-4108-AA02-DFA0A04FC94B}">
-              <ma14:wrappingTextBoxFlag xmlns:ma14="http://schemas.microsoft.com/office/mac/drawingml/2011/main" xmlns:a14="http://schemas.microsoft.com/office/drawing/2010/main" xmlns:m="http://schemas.openxmlformats.org/officeDocument/2006/math" xmlns="" val="1"/>
-            </a:ext>
-          </a:extLst>
-        </p:spPr>
-        <p:txBody>
-          <a:bodyPr lIns="45719" rIns="45719">
-            <a:spAutoFit/>
-          </a:bodyPr>
-          <a:lstStyle>
-            <a:lvl1pPr>
-              <a:lnSpc>
-                <a:spcPct val="120000"/>
-              </a:lnSpc>
-              <a:defRPr sz="2100">
-                <a:solidFill>
-                  <a:srgbClr val="344854"/>
-                </a:solidFill>
-                <a:latin typeface="Arial"/>
-                <a:ea typeface="Arial"/>
-                <a:cs typeface="Arial"/>
-                <a:sym typeface="Arial"/>
-              </a:defRPr>
-            </a:lvl1pPr>
-          </a:lstStyle>
-          <a:p>
-            <a:pPr marL="342900" indent="-342900">
-              <a:buFont typeface="Arial" panose="020B0604020202020204" pitchFamily="34" charset="0"/>
-              <a:buChar char="•"/>
-            </a:pPr>
-            <a:r>
-              <a:rPr lang="en-GB" dirty="0"/>
-              <a:t>We have added Threshold VAR for comparison (Figure 2).</a:t>
-            </a:r>
-          </a:p>
-          <a:p>
-            <a:pPr marL="342900" indent="-342900">
-              <a:buFont typeface="Arial" panose="020B0604020202020204" pitchFamily="34" charset="0"/>
-              <a:buChar char="•"/>
-            </a:pPr>
-            <a:r>
-              <a:rPr lang="en-GB" dirty="0"/>
-              <a:t>Progress on </a:t>
-            </a:r>
-            <a:r>
-              <a:rPr lang="en-GB" b="1" dirty="0"/>
-              <a:t>uncertainty quantification </a:t>
-            </a:r>
-            <a:r>
-              <a:rPr lang="en-GB" dirty="0"/>
-              <a:t>through Bayesian deep learning – MC dropout (Gal and </a:t>
-            </a:r>
-            <a:r>
-              <a:rPr lang="en-GB" dirty="0" err="1"/>
-              <a:t>Ghahramani</a:t>
-            </a:r>
-            <a:r>
-              <a:rPr lang="en-GB" dirty="0"/>
-              <a:t> 2016). Recent work by </a:t>
-            </a:r>
-            <a:r>
-              <a:rPr lang="en-GB" dirty="0" err="1"/>
-              <a:t>Daxberger</a:t>
-            </a:r>
-            <a:r>
-              <a:rPr lang="en-GB" dirty="0"/>
-              <a:t> et al. (2021) shows that Laplace Approximation is a promising way forward.</a:t>
-            </a:r>
           </a:p>
         </p:txBody>
       </p:sp>
@@ -3777,7 +3331,7 @@
           <p:nvPr/>
         </p:nvPicPr>
         <p:blipFill>
-          <a:blip r:embed="rId8">
+          <a:blip r:embed="rId7">
             <a:extLst>
               <a:ext uri="{28A0092B-C50C-407E-A947-70E740481C1C}">
                 <a14:useLocalDpi xmlns:a14="http://schemas.microsoft.com/office/drawing/2010/main" val="0"/>
@@ -3790,7 +3344,7 @@
         </p:blipFill>
         <p:spPr>
           <a:xfrm>
-            <a:off x="30189421" y="19322632"/>
+            <a:off x="14150814" y="403986"/>
             <a:ext cx="2414521" cy="2414521"/>
           </a:xfrm>
           <a:prstGeom prst="rect">
@@ -3812,7 +3366,7 @@
         </p:nvSpPr>
         <p:spPr>
           <a:xfrm>
-            <a:off x="11898085" y="16187473"/>
+            <a:off x="11880669" y="17239851"/>
             <a:ext cx="9064533" cy="415498"/>
           </a:xfrm>
           <a:prstGeom prst="rect">
@@ -3823,7 +3377,7 @@
           </a:ln>
           <a:extLst>
             <a:ext uri="{C572A759-6A51-4108-AA02-DFA0A04FC94B}">
-              <ma14:wrappingTextBoxFlag xmlns:ma14="http://schemas.microsoft.com/office/mac/drawingml/2011/main" xmlns:a14="http://schemas.microsoft.com/office/drawing/2010/main" xmlns:m="http://schemas.openxmlformats.org/officeDocument/2006/math" xmlns="" val="1"/>
+              <ma14:wrappingTextBoxFlag xmlns="" xmlns:m="http://schemas.openxmlformats.org/officeDocument/2006/math" xmlns:a14="http://schemas.microsoft.com/office/drawing/2010/main" xmlns:ma14="http://schemas.microsoft.com/office/mac/drawingml/2011/main" val="1"/>
             </a:ext>
           </a:extLst>
         </p:spPr>
@@ -3864,8 +3418,8 @@
         </p:nvSpPr>
         <p:spPr>
           <a:xfrm>
-            <a:off x="11898085" y="16829334"/>
-            <a:ext cx="9064532" cy="3546868"/>
+            <a:off x="11880669" y="17745187"/>
+            <a:ext cx="9064532" cy="3159070"/>
           </a:xfrm>
           <a:prstGeom prst="rect">
             <a:avLst/>
@@ -3875,7 +3429,7 @@
           </a:ln>
           <a:extLst>
             <a:ext uri="{C572A759-6A51-4108-AA02-DFA0A04FC94B}">
-              <ma14:wrappingTextBoxFlag xmlns:ma14="http://schemas.microsoft.com/office/mac/drawingml/2011/main" xmlns:a14="http://schemas.microsoft.com/office/drawing/2010/main" xmlns:m="http://schemas.openxmlformats.org/officeDocument/2006/math" xmlns="" val="1"/>
+              <ma14:wrappingTextBoxFlag xmlns="" xmlns:m="http://schemas.openxmlformats.org/officeDocument/2006/math" xmlns:a14="http://schemas.microsoft.com/office/drawing/2010/main" xmlns:ma14="http://schemas.microsoft.com/office/mac/drawingml/2011/main" val="1"/>
             </a:ext>
           </a:extLst>
         </p:spPr>
@@ -3902,33 +3456,27 @@
           <a:p>
             <a:r>
               <a:rPr lang="en-GB" dirty="0"/>
-              <a:t>To evaluate our proposed methodology empirically we use the </a:t>
-            </a:r>
-            <a:r>
-              <a:rPr lang="en-GB" b="1" dirty="0"/>
-              <a:t>FRED-MD data base to collect a sample of monthly US data</a:t>
-            </a:r>
-            <a:r>
-              <a:rPr lang="en-GB" dirty="0"/>
-              <a:t> on output (IP), unemployment (UR), inflation (CPI) and interest rates (FFR). Our sample spans the period from January 1959 through March 2021. </a:t>
+              <a:t>In practice decision-making systems are regularly updated. Recent work has investigated the robustness of AR: can we be sure that </a:t>
+            </a:r>
+            <a:r>
+              <a:rPr lang="en-NL" dirty="0"/>
+              <a:t>🐱 can stay wi</a:t>
+            </a:r>
+            <a:r>
+              <a:rPr lang="en-GB" dirty="0" err="1"/>
+              <a:t>th</a:t>
+            </a:r>
+            <a:r>
+              <a:rPr lang="en-NL" dirty="0"/>
+              <a:t> her dog friends after model updates? In our work we go a step further and ask ourselves: does 🐱 herself trigger model shifts through her move across the decision boundary? Does that have consequences for other cats or dogs that want to implement recourse? More generally, </a:t>
+            </a:r>
+            <a:r>
+              <a:rPr lang="en-NL" b="1" dirty="0"/>
+              <a:t>what are the dynamics of algorithmic recourse?</a:t>
             </a:r>
           </a:p>
           <a:p>
-            <a:endParaRPr lang="en-GB" dirty="0"/>
-          </a:p>
-          <a:p>
-            <a:r>
-              <a:rPr lang="en-GB" dirty="0"/>
-              <a:t>Our findings show a </a:t>
-            </a:r>
-            <a:r>
-              <a:rPr lang="en-GB" b="1" dirty="0"/>
-              <a:t>consistent and significant improvement in predictive performance</a:t>
-            </a:r>
-            <a:r>
-              <a:rPr lang="en-GB" dirty="0"/>
-              <a:t>: the Deep VAR incurs much lower loss than the conventional benchmark. It also outperforms other popular approaches that address non-linearity (Threshold VAR and Random Forest).</a:t>
-            </a:r>
+            <a:endParaRPr lang="en-NL" dirty="0"/>
           </a:p>
         </p:txBody>
       </p:sp>
@@ -3947,7 +3495,7 @@
           <p:nvPr/>
         </p:nvPicPr>
         <p:blipFill>
-          <a:blip r:embed="rId9">
+          <a:blip r:embed="rId8">
             <a:extLst>
               <a:ext uri="{28A0092B-C50C-407E-A947-70E740481C1C}">
                 <a14:useLocalDpi xmlns:a14="http://schemas.microsoft.com/office/drawing/2010/main" val="0"/>
@@ -3968,6 +3516,226 @@
           </a:prstGeom>
         </p:spPr>
       </p:pic>
+      <p:grpSp>
+        <p:nvGrpSpPr>
+          <p:cNvPr id="64" name="Group 63">
+            <a:extLst>
+              <a:ext uri="{FF2B5EF4-FFF2-40B4-BE49-F238E27FC236}">
+                <a16:creationId xmlns:a16="http://schemas.microsoft.com/office/drawing/2014/main" id="{BE81093F-6DC2-ED40-BE29-564D11D2BC67}"/>
+              </a:ext>
+            </a:extLst>
+          </p:cNvPr>
+          <p:cNvGrpSpPr/>
+          <p:nvPr/>
+        </p:nvGrpSpPr>
+        <p:grpSpPr>
+          <a:xfrm>
+            <a:off x="11871950" y="6973768"/>
+            <a:ext cx="9029701" cy="5469355"/>
+            <a:chOff x="1177077" y="14856114"/>
+            <a:chExt cx="9029701" cy="5469355"/>
+          </a:xfrm>
+          <a:effectLst>
+            <a:outerShdw blurRad="50800" dist="38100" dir="2700000" algn="tl" rotWithShape="0">
+              <a:schemeClr val="accent1">
+                <a:lumMod val="75000"/>
+                <a:alpha val="40000"/>
+              </a:schemeClr>
+            </a:outerShdw>
+          </a:effectLst>
+        </p:grpSpPr>
+        <p:sp>
+          <p:nvSpPr>
+            <p:cNvPr id="65" name="TextBox 56">
+              <a:extLst>
+                <a:ext uri="{FF2B5EF4-FFF2-40B4-BE49-F238E27FC236}">
+                  <a16:creationId xmlns:a16="http://schemas.microsoft.com/office/drawing/2014/main" id="{6C1EA5BB-6CD6-9146-AB2D-37CF57923769}"/>
+                </a:ext>
+              </a:extLst>
+            </p:cNvPr>
+            <p:cNvSpPr txBox="1"/>
+            <p:nvPr/>
+          </p:nvSpPr>
+          <p:spPr>
+            <a:xfrm>
+              <a:off x="1177077" y="20033081"/>
+              <a:ext cx="9029701" cy="292388"/>
+            </a:xfrm>
+            <a:prstGeom prst="rect">
+              <a:avLst/>
+            </a:prstGeom>
+            <a:ln w="12700">
+              <a:miter lim="400000"/>
+            </a:ln>
+            <a:extLst>
+              <a:ext uri="{C572A759-6A51-4108-AA02-DFA0A04FC94B}">
+                <ma14:wrappingTextBoxFlag xmlns="" xmlns:m="http://schemas.openxmlformats.org/officeDocument/2006/math" xmlns:a14="http://schemas.microsoft.com/office/drawing/2010/main" xmlns:ma14="http://schemas.microsoft.com/office/mac/drawingml/2011/main" val="1"/>
+              </a:ext>
+            </a:extLst>
+          </p:spPr>
+          <p:txBody>
+            <a:bodyPr lIns="45719" rIns="45719">
+              <a:spAutoFit/>
+            </a:bodyPr>
+            <a:lstStyle>
+              <a:lvl1pPr algn="ctr">
+                <a:defRPr sz="1300">
+                  <a:solidFill>
+                    <a:srgbClr val="344854"/>
+                  </a:solidFill>
+                  <a:latin typeface="Arial"/>
+                  <a:ea typeface="Arial"/>
+                  <a:cs typeface="Arial"/>
+                  <a:sym typeface="Arial"/>
+                </a:defRPr>
+              </a:lvl1pPr>
+            </a:lstStyle>
+            <a:p>
+              <a:r>
+                <a:rPr lang="en-GB" dirty="0"/>
+                <a:t>Figure 2: Generating recourse for </a:t>
+              </a:r>
+              <a:r>
+                <a:rPr lang="en-NL" dirty="0"/>
+                <a:t>🐱 following Schut et al. (2021)</a:t>
+              </a:r>
+              <a:r>
+                <a:rPr lang="en-GB" dirty="0"/>
+                <a:t>. Contour shows the predictions of a Bayesian MLP.</a:t>
+              </a:r>
+            </a:p>
+          </p:txBody>
+        </p:sp>
+        <p:pic>
+          <p:nvPicPr>
+            <p:cNvPr id="66" name="Picture 3">
+              <a:extLst>
+                <a:ext uri="{FF2B5EF4-FFF2-40B4-BE49-F238E27FC236}">
+                  <a16:creationId xmlns:a16="http://schemas.microsoft.com/office/drawing/2014/main" id="{07C1AFCF-B207-174D-B13D-6A8DD0742026}"/>
+                </a:ext>
+              </a:extLst>
+            </p:cNvPr>
+            <p:cNvPicPr>
+              <a:picLocks noChangeAspect="1" noChangeArrowheads="1"/>
+            </p:cNvPicPr>
+            <p:nvPr/>
+          </p:nvPicPr>
+          <p:blipFill>
+            <a:blip r:embed="rId9">
+              <a:extLst>
+                <a:ext uri="{28A0092B-C50C-407E-A947-70E740481C1C}">
+                  <a14:useLocalDpi xmlns:a14="http://schemas.microsoft.com/office/drawing/2010/main" val="0"/>
+                </a:ext>
+              </a:extLst>
+            </a:blip>
+            <a:srcRect/>
+            <a:stretch/>
+          </p:blipFill>
+          <p:spPr bwMode="auto">
+            <a:xfrm>
+              <a:off x="2297611" y="14856114"/>
+              <a:ext cx="6788634" cy="5091476"/>
+            </a:xfrm>
+            <a:prstGeom prst="rect">
+              <a:avLst/>
+            </a:prstGeom>
+            <a:noFill/>
+            <a:extLst>
+              <a:ext uri="{909E8E84-426E-40DD-AFC4-6F175D3DCCD1}">
+                <a14:hiddenFill xmlns:a14="http://schemas.microsoft.com/office/drawing/2010/main">
+                  <a:solidFill>
+                    <a:srgbClr val="FFFFFF"/>
+                  </a:solidFill>
+                </a14:hiddenFill>
+              </a:ext>
+            </a:extLst>
+          </p:spPr>
+        </p:pic>
+      </p:grpSp>
+      <p:sp>
+        <p:nvSpPr>
+          <p:cNvPr id="67" name="TextBox 41">
+            <a:extLst>
+              <a:ext uri="{FF2B5EF4-FFF2-40B4-BE49-F238E27FC236}">
+                <a16:creationId xmlns:a16="http://schemas.microsoft.com/office/drawing/2014/main" id="{71C53D40-23F7-AE44-9260-4201D1658314}"/>
+              </a:ext>
+            </a:extLst>
+          </p:cNvPr>
+          <p:cNvSpPr txBox="1"/>
+          <p:nvPr/>
+        </p:nvSpPr>
+        <p:spPr>
+          <a:xfrm>
+            <a:off x="11891854" y="4755959"/>
+            <a:ext cx="9064532" cy="2007794"/>
+          </a:xfrm>
+          <a:prstGeom prst="rect">
+            <a:avLst/>
+          </a:prstGeom>
+          <a:ln w="12700">
+            <a:miter lim="400000"/>
+          </a:ln>
+          <a:extLst>
+            <a:ext uri="{C572A759-6A51-4108-AA02-DFA0A04FC94B}">
+              <ma14:wrappingTextBoxFlag xmlns="" xmlns:m="http://schemas.openxmlformats.org/officeDocument/2006/math" xmlns:a14="http://schemas.microsoft.com/office/drawing/2010/main" xmlns:ma14="http://schemas.microsoft.com/office/mac/drawingml/2011/main" val="1"/>
+            </a:ext>
+          </a:extLst>
+        </p:spPr>
+        <p:txBody>
+          <a:bodyPr wrap="square" lIns="45719" rIns="45719">
+            <a:spAutoFit/>
+          </a:bodyPr>
+          <a:lstStyle>
+            <a:lvl1pPr>
+              <a:lnSpc>
+                <a:spcPct val="120000"/>
+              </a:lnSpc>
+              <a:defRPr sz="2100">
+                <a:solidFill>
+                  <a:srgbClr val="344854"/>
+                </a:solidFill>
+                <a:latin typeface="Arial"/>
+                <a:ea typeface="Arial"/>
+                <a:cs typeface="Arial"/>
+                <a:sym typeface="Arial"/>
+              </a:defRPr>
+            </a:lvl1pPr>
+          </a:lstStyle>
+          <a:p>
+            <a:r>
+              <a:rPr lang="en-GB" dirty="0"/>
+              <a:t>As </a:t>
+            </a:r>
+            <a:r>
+              <a:rPr lang="en-NL" dirty="0"/>
+              <a:t>🐱 crosses the decision boundary she fools the system, but we can still clearly distinguish her from the rest of her dog friends. Her counterfactual self is </a:t>
+            </a:r>
+            <a:r>
+              <a:rPr lang="en-NL" b="1" dirty="0"/>
+              <a:t>ambiguous</a:t>
+            </a:r>
+            <a:r>
+              <a:rPr lang="en-NL" dirty="0"/>
+              <a:t> and </a:t>
+            </a:r>
+            <a:r>
+              <a:rPr lang="en-NL" b="1" dirty="0"/>
+              <a:t>unrealistic</a:t>
+            </a:r>
+            <a:r>
+              <a:rPr lang="en-NL" dirty="0"/>
+              <a:t>.</a:t>
+            </a:r>
+          </a:p>
+          <a:p>
+            <a:r>
+              <a:rPr lang="en-NL" dirty="0"/>
+              <a:t>Consider instead the counterfactual path generated in Figure 2: for the same confidence threshold, 🐱 ends up in much denser area.</a:t>
+            </a:r>
+            <a:endParaRPr lang="en-GB" dirty="0"/>
+          </a:p>
+        </p:txBody>
+      </p:sp>
     </p:spTree>
   </p:cSld>
   <p:clrMapOvr>

</xml_diff>